<commit_message>
cambio en mapa 07-07
</commit_message>
<xml_diff>
--- a/fuentes/contenidos/grado07/guion07/--CN_07_07_1.pptx
+++ b/fuentes/contenidos/grado07/guion07/--CN_07_07_1.pptx
@@ -461,7 +461,7 @@
           <a:p>
             <a:fld id="{5001C876-01F7-4317-94B9-1AE222133113}" type="datetimeFigureOut">
               <a:rPr lang="es-ES" smtClean="0"/>
-              <a:t>14/09/2015</a:t>
+              <a:t>14/01/2016</a:t>
             </a:fld>
             <a:endParaRPr lang="es-ES"/>
           </a:p>
@@ -1617,13 +1617,26 @@
               <a:buChar char="•"/>
             </a:pPr>
             <a:r>
-              <a:rPr lang="es-CO" sz="900" dirty="0" smtClean="0">
+              <a:rPr lang="es-CO" sz="900" smtClean="0">
                 <a:solidFill>
                   <a:schemeClr val="bg1"/>
                 </a:solidFill>
               </a:rPr>
-              <a:t>energía radian</a:t>
-            </a:r>
+              <a:t>energía </a:t>
+            </a:r>
+            <a:r>
+              <a:rPr lang="es-CO" sz="900" smtClean="0">
+                <a:solidFill>
+                  <a:schemeClr val="bg1"/>
+                </a:solidFill>
+              </a:rPr>
+              <a:t>radiante</a:t>
+            </a:r>
+            <a:endParaRPr lang="es-CO" sz="900" dirty="0" smtClean="0">
+              <a:solidFill>
+                <a:schemeClr val="bg1"/>
+              </a:solidFill>
+            </a:endParaRPr>
           </a:p>
           <a:p>
             <a:pPr marL="171450" indent="-171450">
@@ -2149,15 +2162,7 @@
                   <a:schemeClr val="bg1"/>
                 </a:solidFill>
               </a:rPr>
-              <a:t>adenas </a:t>
-            </a:r>
-            <a:r>
-              <a:rPr lang="es-CO" sz="800" dirty="0" smtClean="0">
-                <a:solidFill>
-                  <a:schemeClr val="bg1"/>
-                </a:solidFill>
-              </a:rPr>
-              <a:t>tróficas</a:t>
+              <a:t>adenas tróficas</a:t>
             </a:r>
           </a:p>
           <a:p>

</xml_diff>